<commit_message>
Update OOP part 2
</commit_message>
<xml_diff>
--- a/objects/part_1/python_objects.pptx
+++ b/objects/part_1/python_objects.pptx
@@ -284,7 +284,7 @@
           <a:p>
             <a:fld id="{463A1772-2718-4A87-A3E8-52B3EC469552}" type="datetimeFigureOut">
               <a:rPr lang="en-NL" smtClean="0"/>
-              <a:t>16/03/2021</a:t>
+              <a:t>23/05/2021</a:t>
             </a:fld>
             <a:endParaRPr lang="en-NL"/>
           </a:p>
@@ -484,7 +484,7 @@
           <a:p>
             <a:fld id="{463A1772-2718-4A87-A3E8-52B3EC469552}" type="datetimeFigureOut">
               <a:rPr lang="en-NL" smtClean="0"/>
-              <a:t>16/03/2021</a:t>
+              <a:t>23/05/2021</a:t>
             </a:fld>
             <a:endParaRPr lang="en-NL"/>
           </a:p>
@@ -694,7 +694,7 @@
           <a:p>
             <a:fld id="{463A1772-2718-4A87-A3E8-52B3EC469552}" type="datetimeFigureOut">
               <a:rPr lang="en-NL" smtClean="0"/>
-              <a:t>16/03/2021</a:t>
+              <a:t>23/05/2021</a:t>
             </a:fld>
             <a:endParaRPr lang="en-NL"/>
           </a:p>
@@ -894,7 +894,7 @@
           <a:p>
             <a:fld id="{463A1772-2718-4A87-A3E8-52B3EC469552}" type="datetimeFigureOut">
               <a:rPr lang="en-NL" smtClean="0"/>
-              <a:t>16/03/2021</a:t>
+              <a:t>23/05/2021</a:t>
             </a:fld>
             <a:endParaRPr lang="en-NL"/>
           </a:p>
@@ -1170,7 +1170,7 @@
           <a:p>
             <a:fld id="{463A1772-2718-4A87-A3E8-52B3EC469552}" type="datetimeFigureOut">
               <a:rPr lang="en-NL" smtClean="0"/>
-              <a:t>16/03/2021</a:t>
+              <a:t>23/05/2021</a:t>
             </a:fld>
             <a:endParaRPr lang="en-NL"/>
           </a:p>
@@ -1438,7 +1438,7 @@
           <a:p>
             <a:fld id="{463A1772-2718-4A87-A3E8-52B3EC469552}" type="datetimeFigureOut">
               <a:rPr lang="en-NL" smtClean="0"/>
-              <a:t>16/03/2021</a:t>
+              <a:t>23/05/2021</a:t>
             </a:fld>
             <a:endParaRPr lang="en-NL"/>
           </a:p>
@@ -1853,7 +1853,7 @@
           <a:p>
             <a:fld id="{463A1772-2718-4A87-A3E8-52B3EC469552}" type="datetimeFigureOut">
               <a:rPr lang="en-NL" smtClean="0"/>
-              <a:t>16/03/2021</a:t>
+              <a:t>23/05/2021</a:t>
             </a:fld>
             <a:endParaRPr lang="en-NL"/>
           </a:p>
@@ -1995,7 +1995,7 @@
           <a:p>
             <a:fld id="{463A1772-2718-4A87-A3E8-52B3EC469552}" type="datetimeFigureOut">
               <a:rPr lang="en-NL" smtClean="0"/>
-              <a:t>16/03/2021</a:t>
+              <a:t>23/05/2021</a:t>
             </a:fld>
             <a:endParaRPr lang="en-NL"/>
           </a:p>
@@ -2108,7 +2108,7 @@
           <a:p>
             <a:fld id="{463A1772-2718-4A87-A3E8-52B3EC469552}" type="datetimeFigureOut">
               <a:rPr lang="en-NL" smtClean="0"/>
-              <a:t>16/03/2021</a:t>
+              <a:t>23/05/2021</a:t>
             </a:fld>
             <a:endParaRPr lang="en-NL"/>
           </a:p>
@@ -2421,7 +2421,7 @@
           <a:p>
             <a:fld id="{463A1772-2718-4A87-A3E8-52B3EC469552}" type="datetimeFigureOut">
               <a:rPr lang="en-NL" smtClean="0"/>
-              <a:t>16/03/2021</a:t>
+              <a:t>23/05/2021</a:t>
             </a:fld>
             <a:endParaRPr lang="en-NL"/>
           </a:p>
@@ -2710,7 +2710,7 @@
           <a:p>
             <a:fld id="{463A1772-2718-4A87-A3E8-52B3EC469552}" type="datetimeFigureOut">
               <a:rPr lang="en-NL" smtClean="0"/>
-              <a:t>16/03/2021</a:t>
+              <a:t>23/05/2021</a:t>
             </a:fld>
             <a:endParaRPr lang="en-NL"/>
           </a:p>
@@ -2953,7 +2953,7 @@
           <a:p>
             <a:fld id="{463A1772-2718-4A87-A3E8-52B3EC469552}" type="datetimeFigureOut">
               <a:rPr lang="en-NL" smtClean="0"/>
-              <a:t>16/03/2021</a:t>
+              <a:t>23/05/2021</a:t>
             </a:fld>
             <a:endParaRPr lang="en-NL"/>
           </a:p>
@@ -4357,8 +4357,8 @@
           <a:p>
             <a:pPr algn="ctr"/>
             <a:r>
-              <a:rPr lang="en-US" sz="1600" dirty="0" err="1"/>
-              <a:t>DataBase</a:t>
+              <a:rPr lang="en-US" sz="1600" dirty="0"/>
+              <a:t>Database</a:t>
             </a:r>
             <a:endParaRPr lang="en-NL" sz="1600" dirty="0"/>
           </a:p>

</xml_diff>